<commit_message>
・add resolution and image quality settings ・add argument parser ・several file separation
</commit_message>
<xml_diff>
--- a/src/example/sample.pptx
+++ b/src/example/sample.pptx
@@ -199,7 +199,7 @@
           <a:p>
             <a:fld id="{47B9027C-5DF0-4DB8-88B3-A54EFD623087}" type="datetimeFigureOut">
               <a:rPr kumimoji="1" lang="ja-JP" altLang="en-US" smtClean="0"/>
-              <a:t>2023/5/19</a:t>
+              <a:t>2023/5/29</a:t>
             </a:fld>
             <a:endParaRPr kumimoji="1" lang="ja-JP" altLang="en-US"/>
           </a:p>
@@ -1514,7 +1514,7 @@
           <a:p>
             <a:fld id="{418FCC5A-82E1-493D-BCE6-AD8A742B2BCD}" type="datetimeFigureOut">
               <a:rPr kumimoji="1" lang="ja-JP" altLang="en-US" smtClean="0"/>
-              <a:t>2023/5/19</a:t>
+              <a:t>2023/5/29</a:t>
             </a:fld>
             <a:endParaRPr kumimoji="1" lang="ja-JP" altLang="en-US"/>
           </a:p>
@@ -1744,7 +1744,7 @@
           <a:p>
             <a:fld id="{418FCC5A-82E1-493D-BCE6-AD8A742B2BCD}" type="datetimeFigureOut">
               <a:rPr kumimoji="1" lang="ja-JP" altLang="en-US" smtClean="0"/>
-              <a:t>2023/5/19</a:t>
+              <a:t>2023/5/29</a:t>
             </a:fld>
             <a:endParaRPr kumimoji="1" lang="ja-JP" altLang="en-US"/>
           </a:p>
@@ -1984,7 +1984,7 @@
           <a:p>
             <a:fld id="{418FCC5A-82E1-493D-BCE6-AD8A742B2BCD}" type="datetimeFigureOut">
               <a:rPr kumimoji="1" lang="ja-JP" altLang="en-US" smtClean="0"/>
-              <a:t>2023/5/19</a:t>
+              <a:t>2023/5/29</a:t>
             </a:fld>
             <a:endParaRPr kumimoji="1" lang="ja-JP" altLang="en-US"/>
           </a:p>
@@ -2214,7 +2214,7 @@
           <a:p>
             <a:fld id="{418FCC5A-82E1-493D-BCE6-AD8A742B2BCD}" type="datetimeFigureOut">
               <a:rPr kumimoji="1" lang="ja-JP" altLang="en-US" smtClean="0"/>
-              <a:t>2023/5/19</a:t>
+              <a:t>2023/5/29</a:t>
             </a:fld>
             <a:endParaRPr kumimoji="1" lang="ja-JP" altLang="en-US"/>
           </a:p>
@@ -2489,7 +2489,7 @@
           <a:p>
             <a:fld id="{418FCC5A-82E1-493D-BCE6-AD8A742B2BCD}" type="datetimeFigureOut">
               <a:rPr kumimoji="1" lang="ja-JP" altLang="en-US" smtClean="0"/>
-              <a:t>2023/5/19</a:t>
+              <a:t>2023/5/29</a:t>
             </a:fld>
             <a:endParaRPr kumimoji="1" lang="ja-JP" altLang="en-US"/>
           </a:p>
@@ -2818,7 +2818,7 @@
           <a:p>
             <a:fld id="{418FCC5A-82E1-493D-BCE6-AD8A742B2BCD}" type="datetimeFigureOut">
               <a:rPr kumimoji="1" lang="ja-JP" altLang="en-US" smtClean="0"/>
-              <a:t>2023/5/19</a:t>
+              <a:t>2023/5/29</a:t>
             </a:fld>
             <a:endParaRPr kumimoji="1" lang="ja-JP" altLang="en-US"/>
           </a:p>
@@ -3294,7 +3294,7 @@
           <a:p>
             <a:fld id="{418FCC5A-82E1-493D-BCE6-AD8A742B2BCD}" type="datetimeFigureOut">
               <a:rPr kumimoji="1" lang="ja-JP" altLang="en-US" smtClean="0"/>
-              <a:t>2023/5/19</a:t>
+              <a:t>2023/5/29</a:t>
             </a:fld>
             <a:endParaRPr kumimoji="1" lang="ja-JP" altLang="en-US"/>
           </a:p>
@@ -3435,7 +3435,7 @@
           <a:p>
             <a:fld id="{418FCC5A-82E1-493D-BCE6-AD8A742B2BCD}" type="datetimeFigureOut">
               <a:rPr kumimoji="1" lang="ja-JP" altLang="en-US" smtClean="0"/>
-              <a:t>2023/5/19</a:t>
+              <a:t>2023/5/29</a:t>
             </a:fld>
             <a:endParaRPr kumimoji="1" lang="ja-JP" altLang="en-US"/>
           </a:p>
@@ -3548,7 +3548,7 @@
           <a:p>
             <a:fld id="{418FCC5A-82E1-493D-BCE6-AD8A742B2BCD}" type="datetimeFigureOut">
               <a:rPr kumimoji="1" lang="ja-JP" altLang="en-US" smtClean="0"/>
-              <a:t>2023/5/19</a:t>
+              <a:t>2023/5/29</a:t>
             </a:fld>
             <a:endParaRPr kumimoji="1" lang="ja-JP" altLang="en-US"/>
           </a:p>
@@ -3891,7 +3891,7 @@
           <a:p>
             <a:fld id="{418FCC5A-82E1-493D-BCE6-AD8A742B2BCD}" type="datetimeFigureOut">
               <a:rPr kumimoji="1" lang="ja-JP" altLang="en-US" smtClean="0"/>
-              <a:t>2023/5/19</a:t>
+              <a:t>2023/5/29</a:t>
             </a:fld>
             <a:endParaRPr kumimoji="1" lang="ja-JP" altLang="en-US"/>
           </a:p>
@@ -4179,7 +4179,7 @@
           <a:p>
             <a:fld id="{418FCC5A-82E1-493D-BCE6-AD8A742B2BCD}" type="datetimeFigureOut">
               <a:rPr kumimoji="1" lang="ja-JP" altLang="en-US" smtClean="0"/>
-              <a:t>2023/5/19</a:t>
+              <a:t>2023/5/29</a:t>
             </a:fld>
             <a:endParaRPr kumimoji="1" lang="ja-JP" altLang="en-US"/>
           </a:p>
@@ -4452,7 +4452,7 @@
           <a:p>
             <a:fld id="{418FCC5A-82E1-493D-BCE6-AD8A742B2BCD}" type="datetimeFigureOut">
               <a:rPr kumimoji="1" lang="ja-JP" altLang="en-US" smtClean="0"/>
-              <a:t>2023/5/19</a:t>
+              <a:t>2023/5/29</a:t>
             </a:fld>
             <a:endParaRPr kumimoji="1" lang="ja-JP" altLang="en-US"/>
           </a:p>
@@ -4957,7 +4957,7 @@
         </p:nvSpPr>
         <p:spPr>
           <a:xfrm>
-            <a:off x="3880022" y="2644346"/>
+            <a:off x="1307756" y="3128448"/>
             <a:ext cx="2215978" cy="1729946"/>
           </a:xfrm>
           <a:prstGeom prst="roundRect">
@@ -5007,7 +5007,7 @@
         </p:nvSpPr>
         <p:spPr>
           <a:xfrm>
-            <a:off x="7784757" y="3969909"/>
+            <a:off x="1307756" y="5002685"/>
             <a:ext cx="1581665" cy="1602988"/>
           </a:xfrm>
           <a:prstGeom prst="can">
@@ -5039,6 +5039,53 @@
           </a:p>
         </p:txBody>
       </p:sp>
+      <p:pic>
+        <p:nvPicPr>
+          <p:cNvPr id="1026" name="Picture 2">
+            <a:extLst>
+              <a:ext uri="{FF2B5EF4-FFF2-40B4-BE49-F238E27FC236}">
+                <a16:creationId xmlns:a16="http://schemas.microsoft.com/office/drawing/2014/main" id="{FEFED3B1-504A-F9F4-61D3-5C4DE316D8F9}"/>
+              </a:ext>
+            </a:extLst>
+          </p:cNvPr>
+          <p:cNvPicPr>
+            <a:picLocks noChangeAspect="1" noChangeArrowheads="1"/>
+          </p:cNvPicPr>
+          <p:nvPr/>
+        </p:nvPicPr>
+        <p:blipFill>
+          <a:blip r:embed="rId3">
+            <a:extLst>
+              <a:ext uri="{28A0092B-C50C-407E-A947-70E740481C1C}">
+                <a14:useLocalDpi xmlns:a14="http://schemas.microsoft.com/office/drawing/2010/main" val="0"/>
+              </a:ext>
+            </a:extLst>
+          </a:blip>
+          <a:srcRect/>
+          <a:stretch>
+            <a:fillRect/>
+          </a:stretch>
+        </p:blipFill>
+        <p:spPr bwMode="auto">
+          <a:xfrm>
+            <a:off x="4158818" y="1834979"/>
+            <a:ext cx="5703933" cy="3814505"/>
+          </a:xfrm>
+          <a:prstGeom prst="rect">
+            <a:avLst/>
+          </a:prstGeom>
+          <a:noFill/>
+          <a:extLst>
+            <a:ext uri="{909E8E84-426E-40DD-AFC4-6F175D3DCCD1}">
+              <a14:hiddenFill xmlns:a14="http://schemas.microsoft.com/office/drawing/2010/main">
+                <a:solidFill>
+                  <a:srgbClr val="FFFFFF"/>
+                </a:solidFill>
+              </a14:hiddenFill>
+            </a:ext>
+          </a:extLst>
+        </p:spPr>
+      </p:pic>
     </p:spTree>
     <p:extLst>
       <p:ext uri="{BB962C8B-B14F-4D97-AF65-F5344CB8AC3E}">
@@ -5111,7 +5158,7 @@
         </p:nvSpPr>
         <p:spPr>
           <a:xfrm>
-            <a:off x="1680519" y="2323070"/>
+            <a:off x="1124465" y="1520566"/>
             <a:ext cx="3422822" cy="369332"/>
           </a:xfrm>
           <a:prstGeom prst="rect">
@@ -5126,7 +5173,7 @@
           <a:lstStyle/>
           <a:p>
             <a:r>
-              <a:rPr kumimoji="1" lang="ja-JP" altLang="en-US"/>
+              <a:rPr kumimoji="1" lang="ja-JP" altLang="en-US" dirty="0"/>
               <a:t>テストスライド</a:t>
             </a:r>
           </a:p>
@@ -5182,6 +5229,52 @@
           </a:p>
         </p:txBody>
       </p:sp>
+      <p:sp>
+        <p:nvSpPr>
+          <p:cNvPr id="5" name="楕円 4">
+            <a:extLst>
+              <a:ext uri="{FF2B5EF4-FFF2-40B4-BE49-F238E27FC236}">
+                <a16:creationId xmlns:a16="http://schemas.microsoft.com/office/drawing/2014/main" id="{2C1DA9D2-EDDF-B1B6-C93B-D26C289A6694}"/>
+              </a:ext>
+            </a:extLst>
+          </p:cNvPr>
+          <p:cNvSpPr/>
+          <p:nvPr/>
+        </p:nvSpPr>
+        <p:spPr>
+          <a:xfrm>
+            <a:off x="6808573" y="2471350"/>
+            <a:ext cx="926757" cy="957649"/>
+          </a:xfrm>
+          <a:prstGeom prst="ellipse">
+            <a:avLst/>
+          </a:prstGeom>
+        </p:spPr>
+        <p:style>
+          <a:lnRef idx="2">
+            <a:schemeClr val="accent1">
+              <a:shade val="50000"/>
+            </a:schemeClr>
+          </a:lnRef>
+          <a:fillRef idx="1">
+            <a:schemeClr val="accent1"/>
+          </a:fillRef>
+          <a:effectRef idx="0">
+            <a:schemeClr val="accent1"/>
+          </a:effectRef>
+          <a:fontRef idx="minor">
+            <a:schemeClr val="lt1"/>
+          </a:fontRef>
+        </p:style>
+        <p:txBody>
+          <a:bodyPr rtlCol="0" anchor="ctr"/>
+          <a:lstStyle/>
+          <a:p>
+            <a:pPr algn="ctr"/>
+            <a:endParaRPr kumimoji="1" lang="ja-JP" altLang="en-US"/>
+          </a:p>
+        </p:txBody>
+      </p:sp>
     </p:spTree>
     <p:extLst>
       <p:ext uri="{BB962C8B-B14F-4D97-AF65-F5344CB8AC3E}">
@@ -5192,6 +5285,122 @@
   <p:clrMapOvr>
     <a:masterClrMapping/>
   </p:clrMapOvr>
+  <p:timing>
+    <p:tnLst>
+      <p:par>
+        <p:cTn id="1" dur="indefinite" restart="never" nodeType="tmRoot">
+          <p:childTnLst>
+            <p:seq concurrent="1" nextAc="seek">
+              <p:cTn id="2" dur="indefinite" nodeType="mainSeq">
+                <p:childTnLst>
+                  <p:par>
+                    <p:cTn id="3" fill="hold">
+                      <p:stCondLst>
+                        <p:cond delay="indefinite"/>
+                      </p:stCondLst>
+                      <p:childTnLst>
+                        <p:par>
+                          <p:cTn id="4" fill="hold">
+                            <p:stCondLst>
+                              <p:cond delay="0"/>
+                            </p:stCondLst>
+                            <p:childTnLst>
+                              <p:par>
+                                <p:cTn id="5" presetID="27" presetClass="emph" presetSubtype="0" fill="remove" grpId="0" nodeType="clickEffect">
+                                  <p:stCondLst>
+                                    <p:cond delay="0"/>
+                                  </p:stCondLst>
+                                  <p:childTnLst>
+                                    <p:animClr clrSpc="rgb" dir="cw">
+                                      <p:cBhvr override="childStyle">
+                                        <p:cTn id="6" dur="500" autoRev="1" fill="remove"/>
+                                        <p:tgtEl>
+                                          <p:spTgt spid="5"/>
+                                        </p:tgtEl>
+                                        <p:attrNameLst>
+                                          <p:attrName>style.color</p:attrName>
+                                        </p:attrNameLst>
+                                      </p:cBhvr>
+                                      <p:to>
+                                        <a:schemeClr val="bg1"/>
+                                      </p:to>
+                                    </p:animClr>
+                                    <p:animClr clrSpc="rgb" dir="cw">
+                                      <p:cBhvr>
+                                        <p:cTn id="7" dur="500" autoRev="1" fill="remove"/>
+                                        <p:tgtEl>
+                                          <p:spTgt spid="5"/>
+                                        </p:tgtEl>
+                                        <p:attrNameLst>
+                                          <p:attrName>fillcolor</p:attrName>
+                                        </p:attrNameLst>
+                                      </p:cBhvr>
+                                      <p:to>
+                                        <a:schemeClr val="bg1"/>
+                                      </p:to>
+                                    </p:animClr>
+                                    <p:set>
+                                      <p:cBhvr>
+                                        <p:cTn id="8" dur="500" autoRev="1" fill="remove"/>
+                                        <p:tgtEl>
+                                          <p:spTgt spid="5"/>
+                                        </p:tgtEl>
+                                        <p:attrNameLst>
+                                          <p:attrName>fill.type</p:attrName>
+                                        </p:attrNameLst>
+                                      </p:cBhvr>
+                                      <p:to>
+                                        <p:strVal val="solid"/>
+                                      </p:to>
+                                    </p:set>
+                                    <p:set>
+                                      <p:cBhvr>
+                                        <p:cTn id="9" dur="500" autoRev="1" fill="remove"/>
+                                        <p:tgtEl>
+                                          <p:spTgt spid="5"/>
+                                        </p:tgtEl>
+                                        <p:attrNameLst>
+                                          <p:attrName>fill.on</p:attrName>
+                                        </p:attrNameLst>
+                                      </p:cBhvr>
+                                      <p:to>
+                                        <p:strVal val="true"/>
+                                      </p:to>
+                                    </p:set>
+                                  </p:childTnLst>
+                                </p:cTn>
+                              </p:par>
+                            </p:childTnLst>
+                          </p:cTn>
+                        </p:par>
+                      </p:childTnLst>
+                    </p:cTn>
+                  </p:par>
+                </p:childTnLst>
+              </p:cTn>
+              <p:prevCondLst>
+                <p:cond evt="onPrev" delay="0">
+                  <p:tgtEl>
+                    <p:sldTgt/>
+                  </p:tgtEl>
+                </p:cond>
+              </p:prevCondLst>
+              <p:nextCondLst>
+                <p:cond evt="onNext" delay="0">
+                  <p:tgtEl>
+                    <p:sldTgt/>
+                  </p:tgtEl>
+                </p:cond>
+              </p:nextCondLst>
+            </p:seq>
+          </p:childTnLst>
+        </p:cTn>
+      </p:par>
+    </p:tnLst>
+    <p:bldLst>
+      <p:bldP spid="5" grpId="0" animBg="1"/>
+    </p:bldLst>
+  </p:timing>
 </p:sld>
 </file>
 

</xml_diff>